<commit_message>
some more file is added
</commit_message>
<xml_diff>
--- a/docs/mydocs/SoliditySimplified.pptx
+++ b/docs/mydocs/SoliditySimplified.pptx
@@ -28,6 +28,7 @@
     <p:sldId id="282" r:id="rId22"/>
     <p:sldId id="283" r:id="rId23"/>
     <p:sldId id="284" r:id="rId24"/>
+    <p:sldId id="285" r:id="rId25"/>
   </p:sldIdLst>
   <p:sldSz cx="9144000" cy="6858000" type="screen4x3"/>
   <p:notesSz cx="6858000" cy="9144000"/>
@@ -310,7 +311,7 @@
           <a:p>
             <a:fld id="{11F27572-D965-4EA7-88C7-69DA9BF36063}" type="datetimeFigureOut">
               <a:rPr lang="en-US" smtClean="0"/>
-              <a:t>11/2/2017</a:t>
+              <a:t>12/6/2017</a:t>
             </a:fld>
             <a:endParaRPr lang="en-US"/>
           </a:p>
@@ -475,7 +476,7 @@
           <a:p>
             <a:fld id="{11F27572-D965-4EA7-88C7-69DA9BF36063}" type="datetimeFigureOut">
               <a:rPr lang="en-US" smtClean="0"/>
-              <a:t>11/2/2017</a:t>
+              <a:t>12/6/2017</a:t>
             </a:fld>
             <a:endParaRPr lang="en-US"/>
           </a:p>
@@ -650,7 +651,7 @@
           <a:p>
             <a:fld id="{11F27572-D965-4EA7-88C7-69DA9BF36063}" type="datetimeFigureOut">
               <a:rPr lang="en-US" smtClean="0"/>
-              <a:t>11/2/2017</a:t>
+              <a:t>12/6/2017</a:t>
             </a:fld>
             <a:endParaRPr lang="en-US"/>
           </a:p>
@@ -815,7 +816,7 @@
           <a:p>
             <a:fld id="{11F27572-D965-4EA7-88C7-69DA9BF36063}" type="datetimeFigureOut">
               <a:rPr lang="en-US" smtClean="0"/>
-              <a:t>11/2/2017</a:t>
+              <a:t>12/6/2017</a:t>
             </a:fld>
             <a:endParaRPr lang="en-US"/>
           </a:p>
@@ -1056,7 +1057,7 @@
           <a:p>
             <a:fld id="{11F27572-D965-4EA7-88C7-69DA9BF36063}" type="datetimeFigureOut">
               <a:rPr lang="en-US" smtClean="0"/>
-              <a:t>11/2/2017</a:t>
+              <a:t>12/6/2017</a:t>
             </a:fld>
             <a:endParaRPr lang="en-US"/>
           </a:p>
@@ -1339,7 +1340,7 @@
           <a:p>
             <a:fld id="{11F27572-D965-4EA7-88C7-69DA9BF36063}" type="datetimeFigureOut">
               <a:rPr lang="en-US" smtClean="0"/>
-              <a:t>11/2/2017</a:t>
+              <a:t>12/6/2017</a:t>
             </a:fld>
             <a:endParaRPr lang="en-US"/>
           </a:p>
@@ -1756,7 +1757,7 @@
           <a:p>
             <a:fld id="{11F27572-D965-4EA7-88C7-69DA9BF36063}" type="datetimeFigureOut">
               <a:rPr lang="en-US" smtClean="0"/>
-              <a:t>11/2/2017</a:t>
+              <a:t>12/6/2017</a:t>
             </a:fld>
             <a:endParaRPr lang="en-US"/>
           </a:p>
@@ -1869,7 +1870,7 @@
           <a:p>
             <a:fld id="{11F27572-D965-4EA7-88C7-69DA9BF36063}" type="datetimeFigureOut">
               <a:rPr lang="en-US" smtClean="0"/>
-              <a:t>11/2/2017</a:t>
+              <a:t>12/6/2017</a:t>
             </a:fld>
             <a:endParaRPr lang="en-US"/>
           </a:p>
@@ -1959,7 +1960,7 @@
           <a:p>
             <a:fld id="{11F27572-D965-4EA7-88C7-69DA9BF36063}" type="datetimeFigureOut">
               <a:rPr lang="en-US" smtClean="0"/>
-              <a:t>11/2/2017</a:t>
+              <a:t>12/6/2017</a:t>
             </a:fld>
             <a:endParaRPr lang="en-US"/>
           </a:p>
@@ -2231,7 +2232,7 @@
           <a:p>
             <a:fld id="{11F27572-D965-4EA7-88C7-69DA9BF36063}" type="datetimeFigureOut">
               <a:rPr lang="en-US" smtClean="0"/>
-              <a:t>11/2/2017</a:t>
+              <a:t>12/6/2017</a:t>
             </a:fld>
             <a:endParaRPr lang="en-US"/>
           </a:p>
@@ -2479,7 +2480,7 @@
           <a:p>
             <a:fld id="{11F27572-D965-4EA7-88C7-69DA9BF36063}" type="datetimeFigureOut">
               <a:rPr lang="en-US" smtClean="0"/>
-              <a:t>11/2/2017</a:t>
+              <a:t>12/6/2017</a:t>
             </a:fld>
             <a:endParaRPr lang="en-US"/>
           </a:p>
@@ -2687,7 +2688,7 @@
           <a:p>
             <a:fld id="{11F27572-D965-4EA7-88C7-69DA9BF36063}" type="datetimeFigureOut">
               <a:rPr lang="en-US" smtClean="0"/>
-              <a:t>11/2/2017</a:t>
+              <a:t>12/6/2017</a:t>
             </a:fld>
             <a:endParaRPr lang="en-US"/>
           </a:p>
@@ -3453,7 +3454,7 @@
           <a:graphicData uri="http://schemas.openxmlformats.org/presentationml/2006/ole">
             <mc:AlternateContent xmlns:mc="http://schemas.openxmlformats.org/markup-compatibility/2006">
               <mc:Choice xmlns:v="urn:schemas-microsoft-com:vml" Requires="v">
-                <p:oleObj spid="_x0000_s1075" r:id="rId3" imgW="0" imgH="0" progId="StaticDib">
+                <p:oleObj spid="_x0000_s1077" r:id="rId3" imgW="0" imgH="0" progId="StaticDib">
                   <p:embed/>
                 </p:oleObj>
               </mc:Choice>
@@ -6235,6 +6236,180 @@
 </p:sld>
 </file>
 
+<file path=ppt/slides/slide24.xml><?xml version="1.0" encoding="utf-8"?>
+<p:sld xmlns:a="http://schemas.openxmlformats.org/drawingml/2006/main" xmlns:r="http://schemas.openxmlformats.org/officeDocument/2006/relationships" xmlns:p="http://schemas.openxmlformats.org/presentationml/2006/main">
+  <p:cSld>
+    <p:spTree>
+      <p:nvGrpSpPr>
+        <p:cNvPr id="1" name=""/>
+        <p:cNvGrpSpPr/>
+        <p:nvPr/>
+      </p:nvGrpSpPr>
+      <p:grpSpPr>
+        <a:xfrm>
+          <a:off x="0" y="0"/>
+          <a:ext cx="0" cy="0"/>
+          <a:chOff x="0" y="0"/>
+          <a:chExt cx="0" cy="0"/>
+        </a:xfrm>
+      </p:grpSpPr>
+      <p:sp>
+        <p:nvSpPr>
+          <p:cNvPr id="2" name="Title 1"/>
+          <p:cNvSpPr>
+            <a:spLocks noGrp="1"/>
+          </p:cNvSpPr>
+          <p:nvPr>
+            <p:ph type="title"/>
+          </p:nvPr>
+        </p:nvSpPr>
+        <p:spPr>
+          <a:xfrm>
+            <a:off x="457200" y="274638"/>
+            <a:ext cx="8229600" cy="563562"/>
+          </a:xfrm>
+        </p:spPr>
+        <p:txBody>
+          <a:bodyPr>
+            <a:normAutofit fontScale="90000"/>
+          </a:bodyPr>
+          <a:lstStyle/>
+          <a:p>
+            <a:r>
+              <a:rPr lang="en-US" b="1" dirty="0"/>
+              <a:t>Fallback Function</a:t>
+            </a:r>
+            <a:br>
+              <a:rPr lang="en-US" b="1" dirty="0"/>
+            </a:br>
+            <a:endParaRPr lang="en-US" dirty="0"/>
+          </a:p>
+        </p:txBody>
+      </p:sp>
+      <p:sp>
+        <p:nvSpPr>
+          <p:cNvPr id="3" name="Content Placeholder 2"/>
+          <p:cNvSpPr>
+            <a:spLocks noGrp="1"/>
+          </p:cNvSpPr>
+          <p:nvPr>
+            <p:ph sz="half" idx="1"/>
+          </p:nvPr>
+        </p:nvSpPr>
+        <p:spPr>
+          <a:xfrm>
+            <a:off x="152400" y="685800"/>
+            <a:ext cx="8839200" cy="6019800"/>
+          </a:xfrm>
+        </p:spPr>
+        <p:txBody>
+          <a:bodyPr/>
+          <a:lstStyle/>
+          <a:p>
+            <a:r>
+              <a:rPr lang="en-US" dirty="0"/>
+              <a:t>A contract can have exactly one unnamed function</a:t>
+            </a:r>
+            <a:r>
+              <a:rPr lang="en-US" dirty="0" smtClean="0"/>
+              <a:t>.</a:t>
+            </a:r>
+          </a:p>
+          <a:p>
+            <a:r>
+              <a:rPr lang="en-US" dirty="0"/>
+              <a:t> This function cannot have arguments and cannot return anything</a:t>
+            </a:r>
+            <a:r>
+              <a:rPr lang="en-US" dirty="0" smtClean="0"/>
+              <a:t>.</a:t>
+            </a:r>
+          </a:p>
+          <a:p>
+            <a:r>
+              <a:rPr lang="en-US" dirty="0"/>
+              <a:t>It is executed on a call to the contract if none of the other functions match the given function </a:t>
+            </a:r>
+            <a:r>
+              <a:rPr lang="en-US" dirty="0" smtClean="0"/>
+              <a:t>identifier (</a:t>
+            </a:r>
+            <a:r>
+              <a:rPr lang="en-US" dirty="0" err="1" smtClean="0"/>
+              <a:t>i.e</a:t>
+            </a:r>
+            <a:r>
+              <a:rPr lang="en-US" dirty="0" smtClean="0"/>
+              <a:t> this </a:t>
+            </a:r>
+            <a:r>
+              <a:rPr lang="en-US" dirty="0" err="1" smtClean="0"/>
+              <a:t>fucntion</a:t>
+            </a:r>
+            <a:r>
+              <a:rPr lang="en-US" dirty="0" smtClean="0"/>
+              <a:t> will gets called if you are trying to call the function that does not matches with any function in </a:t>
+            </a:r>
+            <a:r>
+              <a:rPr lang="en-US" smtClean="0"/>
+              <a:t>the contract)</a:t>
+            </a:r>
+            <a:endParaRPr lang="en-US" dirty="0"/>
+          </a:p>
+          <a:p>
+            <a:r>
+              <a:rPr lang="en-US" dirty="0"/>
+              <a:t>function is executed whenever the contract receives plain </a:t>
+            </a:r>
+            <a:r>
+              <a:rPr lang="en-US" dirty="0" smtClean="0"/>
+              <a:t>Ether.</a:t>
+            </a:r>
+          </a:p>
+          <a:p>
+            <a:r>
+              <a:rPr lang="en-US" dirty="0" smtClean="0"/>
+              <a:t>In </a:t>
+            </a:r>
+            <a:r>
+              <a:rPr lang="en-US" dirty="0"/>
+              <a:t>order to receive Ether, the </a:t>
+            </a:r>
+            <a:r>
+              <a:rPr lang="en-US" b="1" dirty="0"/>
+              <a:t>fallback</a:t>
+            </a:r>
+            <a:r>
+              <a:rPr lang="en-US" dirty="0"/>
+              <a:t> function must be marked </a:t>
+            </a:r>
+            <a:r>
+              <a:rPr lang="en-US" dirty="0"/>
+              <a:t>payable</a:t>
+            </a:r>
+            <a:r>
+              <a:rPr lang="en-US" dirty="0" smtClean="0"/>
+              <a:t>.</a:t>
+            </a:r>
+          </a:p>
+          <a:p>
+            <a:endParaRPr lang="en-US" dirty="0"/>
+          </a:p>
+        </p:txBody>
+      </p:sp>
+    </p:spTree>
+    <p:extLst>
+      <p:ext uri="{BB962C8B-B14F-4D97-AF65-F5344CB8AC3E}">
+        <p14:creationId xmlns:p14="http://schemas.microsoft.com/office/powerpoint/2010/main" val="788524559"/>
+      </p:ext>
+    </p:extLst>
+  </p:cSld>
+  <p:clrMapOvr>
+    <a:masterClrMapping/>
+  </p:clrMapOvr>
+</p:sld>
+</file>
+
 <file path=ppt/slides/slide3.xml><?xml version="1.0" encoding="utf-8"?>
 <p:sld xmlns:a="http://schemas.openxmlformats.org/drawingml/2006/main" xmlns:r="http://schemas.openxmlformats.org/officeDocument/2006/relationships" xmlns:p="http://schemas.openxmlformats.org/presentationml/2006/main">
   <p:cSld>
@@ -6759,15 +6934,7 @@
                   <a:srgbClr val="0070C0"/>
                 </a:solidFill>
               </a:rPr>
-              <a:t>. Furthermore, contracts can inherit from other contracts</a:t>
-            </a:r>
-            <a:r>
-              <a:rPr lang="en-US" dirty="0" smtClean="0">
-                <a:solidFill>
-                  <a:srgbClr val="0070C0"/>
-                </a:solidFill>
-              </a:rPr>
-              <a:t>.</a:t>
+              <a:t>. Furthermore, contracts can inherit from other contracts.</a:t>
             </a:r>
           </a:p>
           <a:p>
@@ -8204,7 +8371,7 @@
   <a:extraClrSchemeLst/>
   <a:extLst>
     <a:ext uri="{05A4C25C-085E-4340-85A3-A5531E510DB2}">
-      <thm15:themeFamily xmlns="" xmlns:thm15="http://schemas.microsoft.com/office/thememl/2012/main" name="Office Theme" id="{62F939B6-93AF-4DB8-9C6B-D6C7DFDC589F}" vid="{4A3C46E8-61CC-4603-A589-7422A47A8E4A}"/>
+      <thm15:themeFamily xmlns:thm15="http://schemas.microsoft.com/office/thememl/2012/main" xmlns="" name="Office Theme" id="{62F939B6-93AF-4DB8-9C6B-D6C7DFDC589F}" vid="{4A3C46E8-61CC-4603-A589-7422A47A8E4A}"/>
     </a:ext>
   </a:extLst>
 </a:theme>

</xml_diff>